<commit_message>
feat: Project 3 completed successfully
</commit_message>
<xml_diff>
--- a/project-3/davide-nastri-agile-communication-project-template.pptx
+++ b/project-3/davide-nastri-agile-communication-project-template.pptx
@@ -28961,8 +28961,8 @@
         </p:blipFill>
         <p:spPr>
           <a:xfrm>
-            <a:off x="17137075" y="1211863"/>
-            <a:ext cx="15358650" cy="9516250"/>
+            <a:off x="17137075" y="10912263"/>
+            <a:ext cx="15358650" cy="9516263"/>
           </a:xfrm>
           <a:prstGeom prst="rect">
             <a:avLst/>
@@ -28989,7 +28989,7 @@
         </p:blipFill>
         <p:spPr>
           <a:xfrm>
-            <a:off x="17137075" y="11129863"/>
+            <a:off x="17137075" y="971763"/>
             <a:ext cx="15358650" cy="9516263"/>
           </a:xfrm>
           <a:prstGeom prst="rect">
@@ -29961,8 +29961,8 @@
         </p:blipFill>
         <p:spPr>
           <a:xfrm>
-            <a:off x="18161112" y="30473"/>
-            <a:ext cx="13156188" cy="8151600"/>
+            <a:off x="18161100" y="8182073"/>
+            <a:ext cx="13156200" cy="8151607"/>
           </a:xfrm>
           <a:prstGeom prst="rect">
             <a:avLst/>
@@ -29989,8 +29989,8 @@
         </p:blipFill>
         <p:spPr>
           <a:xfrm>
-            <a:off x="18161100" y="8225600"/>
-            <a:ext cx="13156200" cy="8151598"/>
+            <a:off x="18161100" y="105848"/>
+            <a:ext cx="13156200" cy="8151607"/>
           </a:xfrm>
           <a:prstGeom prst="rect">
             <a:avLst/>
@@ -30626,8 +30626,8 @@
         </p:blipFill>
         <p:spPr>
           <a:xfrm>
-            <a:off x="17807875" y="10897239"/>
-            <a:ext cx="15110525" cy="9362524"/>
+            <a:off x="17807875" y="11189866"/>
+            <a:ext cx="14536247" cy="9006700"/>
           </a:xfrm>
           <a:prstGeom prst="rect">
             <a:avLst/>
@@ -30654,8 +30654,8 @@
         </p:blipFill>
         <p:spPr>
           <a:xfrm>
-            <a:off x="17807875" y="1027600"/>
-            <a:ext cx="15110525" cy="9362512"/>
+            <a:off x="17807875" y="1428991"/>
+            <a:ext cx="14536247" cy="9006700"/>
           </a:xfrm>
           <a:prstGeom prst="rect">
             <a:avLst/>
@@ -31627,8 +31627,8 @@
         </p:blipFill>
         <p:spPr>
           <a:xfrm>
-            <a:off x="18314225" y="7905550"/>
-            <a:ext cx="12849950" cy="7961850"/>
+            <a:off x="18314225" y="105850"/>
+            <a:ext cx="12849950" cy="7961865"/>
           </a:xfrm>
           <a:prstGeom prst="rect">
             <a:avLst/>
@@ -31655,8 +31655,8 @@
         </p:blipFill>
         <p:spPr>
           <a:xfrm>
-            <a:off x="18314225" y="75373"/>
-            <a:ext cx="12849950" cy="7961866"/>
+            <a:off x="18314225" y="8129350"/>
+            <a:ext cx="12849989" cy="7961875"/>
           </a:xfrm>
           <a:prstGeom prst="rect">
             <a:avLst/>
@@ -36314,8 +36314,8 @@
         </p:blipFill>
         <p:spPr>
           <a:xfrm>
-            <a:off x="2895600" y="668825"/>
-            <a:ext cx="13599701" cy="8426400"/>
+            <a:off x="3056475" y="9778216"/>
+            <a:ext cx="14536247" cy="9006700"/>
           </a:xfrm>
           <a:prstGeom prst="rect">
             <a:avLst/>
@@ -36342,8 +36342,8 @@
         </p:blipFill>
         <p:spPr>
           <a:xfrm>
-            <a:off x="2895600" y="10197810"/>
-            <a:ext cx="13599701" cy="8426318"/>
+            <a:off x="3056475" y="699875"/>
+            <a:ext cx="14536250" cy="9006713"/>
           </a:xfrm>
           <a:prstGeom prst="rect">
             <a:avLst/>

</xml_diff>